<commit_message>
modif gab labo 7 en cours
</commit_message>
<xml_diff>
--- a/Theorie/Cours7/Théories PowerPoint/Théories 7/Théorie 7-2- La création d'un objet 3D et son dessin.pptx
+++ b/Theorie/Cours7/Théories PowerPoint/Théories 7/Théorie 7-2- La création d'un objet 3D et son dessin.pptx
@@ -197,7 +197,7 @@
             <a:fld id="{AA309A6D-C09C-4548-B29A-6CF363A7E532}" type="datetimeFigureOut">
               <a:rPr lang="fr-FR" smtClean="0"/>
               <a:pPr/>
-              <a:t>11/03/2020</a:t>
+              <a:t>13/03/2020</a:t>
             </a:fld>
             <a:endParaRPr lang="fr-BE"/>
           </a:p>
@@ -515,7 +515,7 @@
             <a:fld id="{AA309A6D-C09C-4548-B29A-6CF363A7E532}" type="datetimeFigureOut">
               <a:rPr lang="fr-FR" smtClean="0"/>
               <a:pPr/>
-              <a:t>11/03/2020</a:t>
+              <a:t>13/03/2020</a:t>
             </a:fld>
             <a:endParaRPr lang="fr-BE"/>
           </a:p>
@@ -692,7 +692,7 @@
             <a:fld id="{AA309A6D-C09C-4548-B29A-6CF363A7E532}" type="datetimeFigureOut">
               <a:rPr lang="fr-FR" smtClean="0"/>
               <a:pPr/>
-              <a:t>11/03/2020</a:t>
+              <a:t>13/03/2020</a:t>
             </a:fld>
             <a:endParaRPr lang="fr-BE"/>
           </a:p>
@@ -812,7 +812,7 @@
             <a:fld id="{AA309A6D-C09C-4548-B29A-6CF363A7E532}" type="datetimeFigureOut">
               <a:rPr lang="fr-FR" smtClean="0"/>
               <a:pPr/>
-              <a:t>11/03/2020</a:t>
+              <a:t>13/03/2020</a:t>
             </a:fld>
             <a:endParaRPr lang="fr-BE"/>
           </a:p>
@@ -1112,7 +1112,7 @@
             <a:fld id="{AA309A6D-C09C-4548-B29A-6CF363A7E532}" type="datetimeFigureOut">
               <a:rPr lang="fr-FR" smtClean="0"/>
               <a:pPr/>
-              <a:t>11/03/2020</a:t>
+              <a:t>13/03/2020</a:t>
             </a:fld>
             <a:endParaRPr lang="fr-BE"/>
           </a:p>
@@ -1407,7 +1407,7 @@
             <a:fld id="{AA309A6D-C09C-4548-B29A-6CF363A7E532}" type="datetimeFigureOut">
               <a:rPr lang="fr-FR" smtClean="0"/>
               <a:pPr/>
-              <a:t>11/03/2020</a:t>
+              <a:t>13/03/2020</a:t>
             </a:fld>
             <a:endParaRPr lang="fr-BE"/>
           </a:p>
@@ -1837,7 +1837,7 @@
             <a:fld id="{AA309A6D-C09C-4548-B29A-6CF363A7E532}" type="datetimeFigureOut">
               <a:rPr lang="fr-FR" smtClean="0"/>
               <a:pPr/>
-              <a:t>11/03/2020</a:t>
+              <a:t>13/03/2020</a:t>
             </a:fld>
             <a:endParaRPr lang="fr-BE"/>
           </a:p>
@@ -1957,7 +1957,7 @@
             <a:fld id="{AA309A6D-C09C-4548-B29A-6CF363A7E532}" type="datetimeFigureOut">
               <a:rPr lang="fr-FR" smtClean="0"/>
               <a:pPr/>
-              <a:t>11/03/2020</a:t>
+              <a:t>13/03/2020</a:t>
             </a:fld>
             <a:endParaRPr lang="fr-BE"/>
           </a:p>
@@ -2049,7 +2049,7 @@
             <a:fld id="{AA309A6D-C09C-4548-B29A-6CF363A7E532}" type="datetimeFigureOut">
               <a:rPr lang="fr-FR" smtClean="0"/>
               <a:pPr/>
-              <a:t>11/03/2020</a:t>
+              <a:t>13/03/2020</a:t>
             </a:fld>
             <a:endParaRPr lang="fr-BE"/>
           </a:p>
@@ -2301,7 +2301,7 @@
             <a:fld id="{AA309A6D-C09C-4548-B29A-6CF363A7E532}" type="datetimeFigureOut">
               <a:rPr lang="fr-FR" smtClean="0"/>
               <a:pPr/>
-              <a:t>11/03/2020</a:t>
+              <a:t>13/03/2020</a:t>
             </a:fld>
             <a:endParaRPr lang="fr-BE"/>
           </a:p>
@@ -2819,7 +2819,7 @@
             <a:fld id="{AA309A6D-C09C-4548-B29A-6CF363A7E532}" type="datetimeFigureOut">
               <a:rPr lang="fr-FR" smtClean="0"/>
               <a:pPr/>
-              <a:t>11/03/2020</a:t>
+              <a:t>13/03/2020</a:t>
             </a:fld>
             <a:endParaRPr lang="fr-BE"/>
           </a:p>
@@ -3051,7 +3051,7 @@
             <a:fld id="{AA309A6D-C09C-4548-B29A-6CF363A7E532}" type="datetimeFigureOut">
               <a:rPr lang="fr-FR" smtClean="0"/>
               <a:pPr/>
-              <a:t>11/03/2020</a:t>
+              <a:t>13/03/2020</a:t>
             </a:fld>
             <a:endParaRPr lang="fr-BE"/>
           </a:p>
@@ -7956,7 +7956,7 @@
                   <a:srgbClr val="FFFF00"/>
                 </a:solidFill>
               </a:rPr>
-              <a:t>objgl.drawingBufferWidth</a:t>
+              <a:t>objgl.drawingBufferHeight</a:t>
             </a:r>
             <a:r>
               <a:rPr lang="fr-CA" sz="2000" spc="30" dirty="0"/>

</xml_diff>